<commit_message>
removed temp ppt file from repo
</commit_message>
<xml_diff>
--- a/block_diag.pptx
+++ b/block_diag.pptx
@@ -261,7 +261,7 @@
           <a:p>
             <a:fld id="{5EDAD990-EDB0-498B-A180-78F82BBA94D9}" type="datetimeFigureOut">
               <a:rPr lang="en-IN" smtClean="0"/>
-              <a:t>13-08-2023</a:t>
+              <a:t>16-08-2023</a:t>
             </a:fld>
             <a:endParaRPr lang="en-IN"/>
           </a:p>
@@ -461,7 +461,7 @@
           <a:p>
             <a:fld id="{5EDAD990-EDB0-498B-A180-78F82BBA94D9}" type="datetimeFigureOut">
               <a:rPr lang="en-IN" smtClean="0"/>
-              <a:t>13-08-2023</a:t>
+              <a:t>16-08-2023</a:t>
             </a:fld>
             <a:endParaRPr lang="en-IN"/>
           </a:p>
@@ -671,7 +671,7 @@
           <a:p>
             <a:fld id="{5EDAD990-EDB0-498B-A180-78F82BBA94D9}" type="datetimeFigureOut">
               <a:rPr lang="en-IN" smtClean="0"/>
-              <a:t>13-08-2023</a:t>
+              <a:t>16-08-2023</a:t>
             </a:fld>
             <a:endParaRPr lang="en-IN"/>
           </a:p>
@@ -871,7 +871,7 @@
           <a:p>
             <a:fld id="{5EDAD990-EDB0-498B-A180-78F82BBA94D9}" type="datetimeFigureOut">
               <a:rPr lang="en-IN" smtClean="0"/>
-              <a:t>13-08-2023</a:t>
+              <a:t>16-08-2023</a:t>
             </a:fld>
             <a:endParaRPr lang="en-IN"/>
           </a:p>
@@ -1147,7 +1147,7 @@
           <a:p>
             <a:fld id="{5EDAD990-EDB0-498B-A180-78F82BBA94D9}" type="datetimeFigureOut">
               <a:rPr lang="en-IN" smtClean="0"/>
-              <a:t>13-08-2023</a:t>
+              <a:t>16-08-2023</a:t>
             </a:fld>
             <a:endParaRPr lang="en-IN"/>
           </a:p>
@@ -1415,7 +1415,7 @@
           <a:p>
             <a:fld id="{5EDAD990-EDB0-498B-A180-78F82BBA94D9}" type="datetimeFigureOut">
               <a:rPr lang="en-IN" smtClean="0"/>
-              <a:t>13-08-2023</a:t>
+              <a:t>16-08-2023</a:t>
             </a:fld>
             <a:endParaRPr lang="en-IN"/>
           </a:p>
@@ -1830,7 +1830,7 @@
           <a:p>
             <a:fld id="{5EDAD990-EDB0-498B-A180-78F82BBA94D9}" type="datetimeFigureOut">
               <a:rPr lang="en-IN" smtClean="0"/>
-              <a:t>13-08-2023</a:t>
+              <a:t>16-08-2023</a:t>
             </a:fld>
             <a:endParaRPr lang="en-IN"/>
           </a:p>
@@ -1972,7 +1972,7 @@
           <a:p>
             <a:fld id="{5EDAD990-EDB0-498B-A180-78F82BBA94D9}" type="datetimeFigureOut">
               <a:rPr lang="en-IN" smtClean="0"/>
-              <a:t>13-08-2023</a:t>
+              <a:t>16-08-2023</a:t>
             </a:fld>
             <a:endParaRPr lang="en-IN"/>
           </a:p>
@@ -2085,7 +2085,7 @@
           <a:p>
             <a:fld id="{5EDAD990-EDB0-498B-A180-78F82BBA94D9}" type="datetimeFigureOut">
               <a:rPr lang="en-IN" smtClean="0"/>
-              <a:t>13-08-2023</a:t>
+              <a:t>16-08-2023</a:t>
             </a:fld>
             <a:endParaRPr lang="en-IN"/>
           </a:p>
@@ -2398,7 +2398,7 @@
           <a:p>
             <a:fld id="{5EDAD990-EDB0-498B-A180-78F82BBA94D9}" type="datetimeFigureOut">
               <a:rPr lang="en-IN" smtClean="0"/>
-              <a:t>13-08-2023</a:t>
+              <a:t>16-08-2023</a:t>
             </a:fld>
             <a:endParaRPr lang="en-IN"/>
           </a:p>
@@ -2687,7 +2687,7 @@
           <a:p>
             <a:fld id="{5EDAD990-EDB0-498B-A180-78F82BBA94D9}" type="datetimeFigureOut">
               <a:rPr lang="en-IN" smtClean="0"/>
-              <a:t>13-08-2023</a:t>
+              <a:t>16-08-2023</a:t>
             </a:fld>
             <a:endParaRPr lang="en-IN"/>
           </a:p>
@@ -2930,7 +2930,7 @@
           <a:p>
             <a:fld id="{5EDAD990-EDB0-498B-A180-78F82BBA94D9}" type="datetimeFigureOut">
               <a:rPr lang="en-IN" smtClean="0"/>
-              <a:t>13-08-2023</a:t>
+              <a:t>16-08-2023</a:t>
             </a:fld>
             <a:endParaRPr lang="en-IN"/>
           </a:p>
@@ -3333,6 +3333,17 @@
 <file path=ppt/slides/slide1.xml><?xml version="1.0" encoding="utf-8"?>
 <p:sld xmlns:a="http://schemas.openxmlformats.org/drawingml/2006/main" xmlns:r="http://schemas.openxmlformats.org/officeDocument/2006/relationships" xmlns:p="http://schemas.openxmlformats.org/presentationml/2006/main">
   <p:cSld>
+    <p:bg>
+      <p:bgPr>
+        <a:solidFill>
+          <a:schemeClr val="tx1">
+            <a:lumMod val="65000"/>
+            <a:lumOff val="35000"/>
+          </a:schemeClr>
+        </a:solidFill>
+        <a:effectLst/>
+      </p:bgPr>
+    </p:bg>
     <p:spTree>
       <p:nvGrpSpPr>
         <p:cNvPr id="1" name=""/>
@@ -3378,20 +3389,121 @@
             <a:pPr algn="ctr"/>
             <a:r>
               <a:rPr lang="en-IN" sz="900" dirty="0">
+                <a:solidFill>
+                  <a:schemeClr val="bg1">
+                    <a:lumMod val="85000"/>
+                  </a:schemeClr>
+                </a:solidFill>
                 <a:latin typeface="Rockwell" panose="02060603020205020403" pitchFamily="18" charset="0"/>
               </a:rPr>
               <a:t>POST request </a:t>
             </a:r>
             <a:br>
               <a:rPr lang="en-IN" sz="900" dirty="0">
+                <a:solidFill>
+                  <a:schemeClr val="bg1">
+                    <a:lumMod val="85000"/>
+                  </a:schemeClr>
+                </a:solidFill>
                 <a:latin typeface="Rockwell" panose="02060603020205020403" pitchFamily="18" charset="0"/>
               </a:rPr>
             </a:br>
             <a:r>
               <a:rPr lang="en-IN" sz="900" dirty="0">
+                <a:solidFill>
+                  <a:schemeClr val="bg1">
+                    <a:lumMod val="85000"/>
+                  </a:schemeClr>
+                </a:solidFill>
                 <a:latin typeface="Rockwell" panose="02060603020205020403" pitchFamily="18" charset="0"/>
               </a:rPr>
               <a:t>user-id and query string</a:t>
+            </a:r>
+          </a:p>
+        </p:txBody>
+      </p:sp>
+      <p:sp>
+        <p:nvSpPr>
+          <p:cNvPr id="56" name="TextBox 55">
+            <a:extLst>
+              <a:ext uri="{FF2B5EF4-FFF2-40B4-BE49-F238E27FC236}">
+                <a16:creationId xmlns:a16="http://schemas.microsoft.com/office/drawing/2014/main" id="{B49AE399-BAF3-0729-5877-7D741FBC18D7}"/>
+              </a:ext>
+            </a:extLst>
+          </p:cNvPr>
+          <p:cNvSpPr txBox="1"/>
+          <p:nvPr/>
+        </p:nvSpPr>
+        <p:spPr>
+          <a:xfrm>
+            <a:off x="2467021" y="3532997"/>
+            <a:ext cx="1544340" cy="784830"/>
+          </a:xfrm>
+          <a:prstGeom prst="rect">
+            <a:avLst/>
+          </a:prstGeom>
+          <a:noFill/>
+        </p:spPr>
+        <p:txBody>
+          <a:bodyPr wrap="square" rtlCol="0">
+            <a:spAutoFit/>
+          </a:bodyPr>
+          <a:lstStyle/>
+          <a:p>
+            <a:pPr algn="ctr"/>
+            <a:r>
+              <a:rPr lang="en-IN" sz="900" dirty="0">
+                <a:solidFill>
+                  <a:schemeClr val="bg1">
+                    <a:lumMod val="85000"/>
+                  </a:schemeClr>
+                </a:solidFill>
+                <a:latin typeface="Rockwell" panose="02060603020205020403" pitchFamily="18" charset="0"/>
+              </a:rPr>
+              <a:t>JSON response </a:t>
+            </a:r>
+            <a:br>
+              <a:rPr lang="en-IN" sz="900" dirty="0">
+                <a:solidFill>
+                  <a:schemeClr val="bg1">
+                    <a:lumMod val="85000"/>
+                  </a:schemeClr>
+                </a:solidFill>
+                <a:latin typeface="Rockwell" panose="02060603020205020403" pitchFamily="18" charset="0"/>
+              </a:rPr>
+            </a:br>
+            <a:r>
+              <a:rPr lang="en-IN" sz="900" dirty="0">
+                <a:solidFill>
+                  <a:schemeClr val="bg1">
+                    <a:lumMod val="85000"/>
+                  </a:schemeClr>
+                </a:solidFill>
+                <a:latin typeface="Rockwell" panose="02060603020205020403" pitchFamily="18" charset="0"/>
+              </a:rPr>
+              <a:t>Link to locally stored </a:t>
+            </a:r>
+            <a:r>
+              <a:rPr lang="en-IN" sz="900" dirty="0" err="1">
+                <a:solidFill>
+                  <a:schemeClr val="bg1">
+                    <a:lumMod val="85000"/>
+                  </a:schemeClr>
+                </a:solidFill>
+                <a:latin typeface="Rockwell" panose="02060603020205020403" pitchFamily="18" charset="0"/>
+              </a:rPr>
+              <a:t>genAI</a:t>
+            </a:r>
+            <a:r>
+              <a:rPr lang="en-IN" sz="900" dirty="0">
+                <a:solidFill>
+                  <a:schemeClr val="bg1">
+                    <a:lumMod val="85000"/>
+                  </a:schemeClr>
+                </a:solidFill>
+                <a:latin typeface="Rockwell" panose="02060603020205020403" pitchFamily="18" charset="0"/>
+              </a:rPr>
+              <a:t> image + links to best matching on-sale clothes</a:t>
             </a:r>
           </a:p>
         </p:txBody>
@@ -3502,6 +3614,11 @@
             <a:avLst/>
           </a:prstGeom>
           <a:ln>
+            <a:solidFill>
+              <a:schemeClr val="bg1">
+                <a:lumMod val="75000"/>
+              </a:schemeClr>
+            </a:solidFill>
             <a:tailEnd type="triangle"/>
           </a:ln>
         </p:spPr>
@@ -3600,6 +3717,11 @@
             <a:avLst/>
           </a:prstGeom>
           <a:ln>
+            <a:solidFill>
+              <a:schemeClr val="bg1">
+                <a:lumMod val="75000"/>
+              </a:schemeClr>
+            </a:solidFill>
             <a:tailEnd type="triangle"/>
           </a:ln>
         </p:spPr>
@@ -4045,67 +4167,6 @@
           </a:fontRef>
         </p:style>
       </p:cxnSp>
-      <p:sp>
-        <p:nvSpPr>
-          <p:cNvPr id="56" name="TextBox 55">
-            <a:extLst>
-              <a:ext uri="{FF2B5EF4-FFF2-40B4-BE49-F238E27FC236}">
-                <a16:creationId xmlns:a16="http://schemas.microsoft.com/office/drawing/2014/main" id="{B49AE399-BAF3-0729-5877-7D741FBC18D7}"/>
-              </a:ext>
-            </a:extLst>
-          </p:cNvPr>
-          <p:cNvSpPr txBox="1"/>
-          <p:nvPr/>
-        </p:nvSpPr>
-        <p:spPr>
-          <a:xfrm>
-            <a:off x="2467021" y="3532997"/>
-            <a:ext cx="1544340" cy="784830"/>
-          </a:xfrm>
-          <a:prstGeom prst="rect">
-            <a:avLst/>
-          </a:prstGeom>
-          <a:noFill/>
-        </p:spPr>
-        <p:txBody>
-          <a:bodyPr wrap="square" rtlCol="0">
-            <a:spAutoFit/>
-          </a:bodyPr>
-          <a:lstStyle/>
-          <a:p>
-            <a:pPr algn="ctr"/>
-            <a:r>
-              <a:rPr lang="en-IN" sz="900" dirty="0">
-                <a:latin typeface="Rockwell" panose="02060603020205020403" pitchFamily="18" charset="0"/>
-              </a:rPr>
-              <a:t>JSON response </a:t>
-            </a:r>
-            <a:br>
-              <a:rPr lang="en-IN" sz="900" dirty="0">
-                <a:latin typeface="Rockwell" panose="02060603020205020403" pitchFamily="18" charset="0"/>
-              </a:rPr>
-            </a:br>
-            <a:r>
-              <a:rPr lang="en-IN" sz="900" dirty="0">
-                <a:latin typeface="Rockwell" panose="02060603020205020403" pitchFamily="18" charset="0"/>
-              </a:rPr>
-              <a:t>Link to locally stored </a:t>
-            </a:r>
-            <a:r>
-              <a:rPr lang="en-IN" sz="900" dirty="0" err="1">
-                <a:latin typeface="Rockwell" panose="02060603020205020403" pitchFamily="18" charset="0"/>
-              </a:rPr>
-              <a:t>genAI</a:t>
-            </a:r>
-            <a:r>
-              <a:rPr lang="en-IN" sz="900" dirty="0">
-                <a:latin typeface="Rockwell" panose="02060603020205020403" pitchFamily="18" charset="0"/>
-              </a:rPr>
-              <a:t> image + links to best matching on-sale clothes</a:t>
-            </a:r>
-          </a:p>
-        </p:txBody>
-      </p:sp>
       <p:sp>
         <p:nvSpPr>
           <p:cNvPr id="57" name="TextBox 56">

</xml_diff>